<commit_message>
docs(progress_log): updated for week 20-03
</commit_message>
<xml_diff>
--- a/presentations/progress_log.pptx
+++ b/presentations/progress_log.pptx
@@ -6,13 +6,16 @@
   </p:sldMasterIdLst>
   <p:sldIdLst>
     <p:sldId id="256" r:id="rId2"/>
-    <p:sldId id="257" r:id="rId3"/>
-    <p:sldId id="258" r:id="rId4"/>
-    <p:sldId id="259" r:id="rId5"/>
-    <p:sldId id="260" r:id="rId6"/>
-    <p:sldId id="261" r:id="rId7"/>
-    <p:sldId id="262" r:id="rId8"/>
-    <p:sldId id="263" r:id="rId9"/>
+    <p:sldId id="264" r:id="rId3"/>
+    <p:sldId id="265" r:id="rId4"/>
+    <p:sldId id="257" r:id="rId5"/>
+    <p:sldId id="258" r:id="rId6"/>
+    <p:sldId id="259" r:id="rId7"/>
+    <p:sldId id="260" r:id="rId8"/>
+    <p:sldId id="261" r:id="rId9"/>
+    <p:sldId id="262" r:id="rId10"/>
+    <p:sldId id="263" r:id="rId11"/>
+    <p:sldId id="266" r:id="rId12"/>
   </p:sldIdLst>
   <p:sldSz cx="9144000" cy="6858000" type="screen4x3"/>
   <p:notesSz cx="6858000" cy="9144000"/>
@@ -349,7 +352,7 @@
           <a:p>
             <a:fld id="{BE740BB2-E612-45CF-96A8-BE4D5B63A40C}" type="datetimeFigureOut">
               <a:rPr lang="nl-NL" smtClean="0"/>
-              <a:t>10-3-2017</a:t>
+              <a:t>17-3-2017</a:t>
             </a:fld>
             <a:endParaRPr lang="nl-NL"/>
           </a:p>
@@ -536,7 +539,7 @@
           <a:p>
             <a:fld id="{BE740BB2-E612-45CF-96A8-BE4D5B63A40C}" type="datetimeFigureOut">
               <a:rPr lang="nl-NL" smtClean="0"/>
-              <a:t>10-3-2017</a:t>
+              <a:t>17-3-2017</a:t>
             </a:fld>
             <a:endParaRPr lang="nl-NL"/>
           </a:p>
@@ -711,7 +714,7 @@
           <a:p>
             <a:fld id="{BE740BB2-E612-45CF-96A8-BE4D5B63A40C}" type="datetimeFigureOut">
               <a:rPr lang="nl-NL" smtClean="0"/>
-              <a:t>10-3-2017</a:t>
+              <a:t>17-3-2017</a:t>
             </a:fld>
             <a:endParaRPr lang="nl-NL"/>
           </a:p>
@@ -891,7 +894,7 @@
           <a:p>
             <a:fld id="{BE740BB2-E612-45CF-96A8-BE4D5B63A40C}" type="datetimeFigureOut">
               <a:rPr lang="nl-NL" smtClean="0"/>
-              <a:t>10-3-2017</a:t>
+              <a:t>17-3-2017</a:t>
             </a:fld>
             <a:endParaRPr lang="nl-NL"/>
           </a:p>
@@ -1138,7 +1141,7 @@
           <a:p>
             <a:fld id="{BE740BB2-E612-45CF-96A8-BE4D5B63A40C}" type="datetimeFigureOut">
               <a:rPr lang="nl-NL" smtClean="0"/>
-              <a:t>10-3-2017</a:t>
+              <a:t>17-3-2017</a:t>
             </a:fld>
             <a:endParaRPr lang="nl-NL"/>
           </a:p>
@@ -1612,7 +1615,7 @@
           <a:p>
             <a:fld id="{BE740BB2-E612-45CF-96A8-BE4D5B63A40C}" type="datetimeFigureOut">
               <a:rPr lang="nl-NL" smtClean="0"/>
-              <a:t>10-3-2017</a:t>
+              <a:t>17-3-2017</a:t>
             </a:fld>
             <a:endParaRPr lang="nl-NL"/>
           </a:p>
@@ -2027,7 +2030,7 @@
           <a:p>
             <a:fld id="{BE740BB2-E612-45CF-96A8-BE4D5B63A40C}" type="datetimeFigureOut">
               <a:rPr lang="nl-NL" smtClean="0"/>
-              <a:t>10-3-2017</a:t>
+              <a:t>17-3-2017</a:t>
             </a:fld>
             <a:endParaRPr lang="nl-NL"/>
           </a:p>
@@ -2158,7 +2161,7 @@
           <a:p>
             <a:fld id="{BE740BB2-E612-45CF-96A8-BE4D5B63A40C}" type="datetimeFigureOut">
               <a:rPr lang="nl-NL" smtClean="0"/>
-              <a:t>10-3-2017</a:t>
+              <a:t>17-3-2017</a:t>
             </a:fld>
             <a:endParaRPr lang="nl-NL"/>
           </a:p>
@@ -2253,7 +2256,7 @@
           <a:p>
             <a:fld id="{BE740BB2-E612-45CF-96A8-BE4D5B63A40C}" type="datetimeFigureOut">
               <a:rPr lang="nl-NL" smtClean="0"/>
-              <a:t>10-3-2017</a:t>
+              <a:t>17-3-2017</a:t>
             </a:fld>
             <a:endParaRPr lang="nl-NL"/>
           </a:p>
@@ -2531,7 +2534,7 @@
           <a:p>
             <a:fld id="{BE740BB2-E612-45CF-96A8-BE4D5B63A40C}" type="datetimeFigureOut">
               <a:rPr lang="nl-NL" smtClean="0"/>
-              <a:t>10-3-2017</a:t>
+              <a:t>17-3-2017</a:t>
             </a:fld>
             <a:endParaRPr lang="nl-NL"/>
           </a:p>
@@ -2783,7 +2786,7 @@
           <a:p>
             <a:fld id="{BE740BB2-E612-45CF-96A8-BE4D5B63A40C}" type="datetimeFigureOut">
               <a:rPr lang="nl-NL" smtClean="0"/>
-              <a:t>10-3-2017</a:t>
+              <a:t>17-3-2017</a:t>
             </a:fld>
             <a:endParaRPr lang="nl-NL"/>
           </a:p>
@@ -3155,7 +3158,7 @@
           <a:p>
             <a:fld id="{BE740BB2-E612-45CF-96A8-BE4D5B63A40C}" type="datetimeFigureOut">
               <a:rPr lang="nl-NL" smtClean="0"/>
-              <a:t>10-3-2017</a:t>
+              <a:t>17-3-2017</a:t>
             </a:fld>
             <a:endParaRPr lang="nl-NL"/>
           </a:p>
@@ -3653,10 +3656,228 @@
           </a:p>
         </p:txBody>
       </p:sp>
+      <p:sp>
+        <p:nvSpPr>
+          <p:cNvPr id="6" name="Tekstvak 5"/>
+          <p:cNvSpPr txBox="1"/>
+          <p:nvPr/>
+        </p:nvSpPr>
+        <p:spPr>
+          <a:xfrm>
+            <a:off x="140338" y="6309320"/>
+            <a:ext cx="8863324" cy="369332"/>
+          </a:xfrm>
+          <a:prstGeom prst="rect">
+            <a:avLst/>
+          </a:prstGeom>
+          <a:noFill/>
+        </p:spPr>
+        <p:txBody>
+          <a:bodyPr wrap="none" rtlCol="0">
+            <a:spAutoFit/>
+          </a:bodyPr>
+          <a:lstStyle/>
+          <a:p>
+            <a:r>
+              <a:rPr lang="nl-NL" dirty="0"/>
+              <a:t>Loek </a:t>
+            </a:r>
+            <a:r>
+              <a:rPr lang="nl-NL" dirty="0" err="1"/>
+              <a:t>Ehren</a:t>
+            </a:r>
+            <a:r>
+              <a:rPr lang="nl-NL" dirty="0"/>
+              <a:t>, Mike </a:t>
+            </a:r>
+            <a:r>
+              <a:rPr lang="nl-NL" dirty="0" err="1"/>
+              <a:t>Schatorjé</a:t>
+            </a:r>
+            <a:r>
+              <a:rPr lang="nl-NL" dirty="0"/>
+              <a:t>, Simone Francesco, </a:t>
+            </a:r>
+            <a:r>
+              <a:rPr lang="nl-NL" dirty="0" err="1"/>
+              <a:t>Herm</a:t>
+            </a:r>
+            <a:r>
+              <a:rPr lang="nl-NL" dirty="0"/>
+              <a:t> </a:t>
+            </a:r>
+            <a:r>
+              <a:rPr lang="nl-NL" dirty="0" err="1"/>
+              <a:t>Lecluse</a:t>
+            </a:r>
+            <a:r>
+              <a:rPr lang="nl-NL" dirty="0"/>
+              <a:t> &amp; Rick van </a:t>
+            </a:r>
+            <a:r>
+              <a:rPr lang="nl-NL" dirty="0" err="1"/>
+              <a:t>Osch</a:t>
+            </a:r>
+            <a:endParaRPr lang="nl-NL" dirty="0"/>
+          </a:p>
+        </p:txBody>
+      </p:sp>
     </p:spTree>
     <p:extLst>
       <p:ext uri="{BB962C8B-B14F-4D97-AF65-F5344CB8AC3E}">
         <p14:creationId xmlns:p14="http://schemas.microsoft.com/office/powerpoint/2010/main" val="2039421130"/>
+      </p:ext>
+    </p:extLst>
+  </p:cSld>
+  <p:clrMapOvr>
+    <a:masterClrMapping/>
+  </p:clrMapOvr>
+</p:sld>
+</file>
+
+<file path=ppt/slides/slide10.xml><?xml version="1.0" encoding="utf-8"?>
+<p:sld xmlns:a="http://schemas.openxmlformats.org/drawingml/2006/main" xmlns:r="http://schemas.openxmlformats.org/officeDocument/2006/relationships" xmlns:p="http://schemas.openxmlformats.org/presentationml/2006/main">
+  <p:cSld>
+    <p:spTree>
+      <p:nvGrpSpPr>
+        <p:cNvPr id="1" name=""/>
+        <p:cNvGrpSpPr/>
+        <p:nvPr/>
+      </p:nvGrpSpPr>
+      <p:grpSpPr>
+        <a:xfrm>
+          <a:off x="0" y="0"/>
+          <a:ext cx="0" cy="0"/>
+          <a:chOff x="0" y="0"/>
+          <a:chExt cx="0" cy="0"/>
+        </a:xfrm>
+      </p:grpSpPr>
+      <p:sp>
+        <p:nvSpPr>
+          <p:cNvPr id="2" name="Titel 1"/>
+          <p:cNvSpPr>
+            <a:spLocks noGrp="1"/>
+          </p:cNvSpPr>
+          <p:nvPr>
+            <p:ph type="title"/>
+          </p:nvPr>
+        </p:nvSpPr>
+        <p:spPr/>
+        <p:txBody>
+          <a:bodyPr/>
+          <a:lstStyle/>
+          <a:p>
+            <a:r>
+              <a:rPr lang="en-US" dirty="0"/>
+              <a:t>How are we going to do it?</a:t>
+            </a:r>
+            <a:endParaRPr lang="nl-NL" dirty="0"/>
+          </a:p>
+        </p:txBody>
+      </p:sp>
+      <p:sp>
+        <p:nvSpPr>
+          <p:cNvPr id="3" name="Tijdelijke aanduiding voor inhoud 2"/>
+          <p:cNvSpPr>
+            <a:spLocks noGrp="1"/>
+          </p:cNvSpPr>
+          <p:nvPr>
+            <p:ph idx="1"/>
+          </p:nvPr>
+        </p:nvSpPr>
+        <p:spPr/>
+        <p:txBody>
+          <a:bodyPr/>
+          <a:lstStyle/>
+          <a:p>
+            <a:r>
+              <a:rPr lang="en-US" dirty="0"/>
+              <a:t>Brainstorming/discussing</a:t>
+            </a:r>
+          </a:p>
+          <a:p>
+            <a:r>
+              <a:rPr lang="en-US" dirty="0"/>
+              <a:t>Determine what is important</a:t>
+            </a:r>
+          </a:p>
+          <a:p>
+            <a:pPr lvl="1"/>
+            <a:r>
+              <a:rPr lang="en-US" dirty="0"/>
+              <a:t>What results are we looking for?</a:t>
+            </a:r>
+          </a:p>
+          <a:p>
+            <a:pPr lvl="1"/>
+            <a:r>
+              <a:rPr lang="en-US" dirty="0"/>
+              <a:t>How can we achieve this?</a:t>
+            </a:r>
+          </a:p>
+        </p:txBody>
+      </p:sp>
+    </p:spTree>
+    <p:extLst>
+      <p:ext uri="{BB962C8B-B14F-4D97-AF65-F5344CB8AC3E}">
+        <p14:creationId xmlns:p14="http://schemas.microsoft.com/office/powerpoint/2010/main" val="3203515607"/>
+      </p:ext>
+    </p:extLst>
+  </p:cSld>
+  <p:clrMapOvr>
+    <a:masterClrMapping/>
+  </p:clrMapOvr>
+</p:sld>
+</file>
+
+<file path=ppt/slides/slide11.xml><?xml version="1.0" encoding="utf-8"?>
+<p:sld xmlns:a="http://schemas.openxmlformats.org/drawingml/2006/main" xmlns:r="http://schemas.openxmlformats.org/officeDocument/2006/relationships" xmlns:p="http://schemas.openxmlformats.org/presentationml/2006/main">
+  <p:cSld>
+    <p:spTree>
+      <p:nvGrpSpPr>
+        <p:cNvPr id="1" name=""/>
+        <p:cNvGrpSpPr/>
+        <p:nvPr/>
+      </p:nvGrpSpPr>
+      <p:grpSpPr>
+        <a:xfrm>
+          <a:off x="0" y="0"/>
+          <a:ext cx="0" cy="0"/>
+          <a:chOff x="0" y="0"/>
+          <a:chExt cx="0" cy="0"/>
+        </a:xfrm>
+      </p:grpSpPr>
+      <p:sp>
+        <p:nvSpPr>
+          <p:cNvPr id="2" name="Titel 1"/>
+          <p:cNvSpPr>
+            <a:spLocks noGrp="1"/>
+          </p:cNvSpPr>
+          <p:nvPr>
+            <p:ph type="title"/>
+          </p:nvPr>
+        </p:nvSpPr>
+        <p:spPr/>
+        <p:txBody>
+          <a:bodyPr/>
+          <a:lstStyle/>
+          <a:p>
+            <a:pPr algn="ctr"/>
+            <a:r>
+              <a:rPr lang="nl-NL" dirty="0" err="1"/>
+              <a:t>Questions</a:t>
+            </a:r>
+            <a:r>
+              <a:rPr lang="nl-NL" dirty="0"/>
+              <a:t>?</a:t>
+            </a:r>
+          </a:p>
+        </p:txBody>
+      </p:sp>
+    </p:spTree>
+    <p:extLst>
+      <p:ext uri="{BB962C8B-B14F-4D97-AF65-F5344CB8AC3E}">
+        <p14:creationId xmlns:p14="http://schemas.microsoft.com/office/powerpoint/2010/main" val="481489837"/>
       </p:ext>
     </p:extLst>
   </p:cSld>
@@ -3699,65 +3920,113 @@
           <a:lstStyle/>
           <a:p>
             <a:r>
-              <a:rPr lang="en-US" dirty="0"/>
-              <a:t>What did we want to achieve?</a:t>
+              <a:rPr lang="nl-NL" dirty="0"/>
+              <a:t>The project</a:t>
+            </a:r>
+          </a:p>
+        </p:txBody>
+      </p:sp>
+      <p:sp>
+        <p:nvSpPr>
+          <p:cNvPr id="3" name="Tijdelijke aanduiding voor inhoud 2"/>
+          <p:cNvSpPr>
+            <a:spLocks noGrp="1"/>
+          </p:cNvSpPr>
+          <p:nvPr>
+            <p:ph idx="1"/>
+          </p:nvPr>
+        </p:nvSpPr>
+        <p:spPr/>
+        <p:txBody>
+          <a:bodyPr/>
+          <a:lstStyle/>
+          <a:p>
+            <a:r>
+              <a:rPr lang="nl-NL" dirty="0"/>
+              <a:t>Underground </a:t>
+            </a:r>
+            <a:r>
+              <a:rPr lang="nl-NL" dirty="0" err="1"/>
+              <a:t>garbage</a:t>
+            </a:r>
+            <a:r>
+              <a:rPr lang="nl-NL" dirty="0"/>
+              <a:t> containers</a:t>
+            </a:r>
+          </a:p>
+          <a:p>
+            <a:r>
+              <a:rPr lang="nl-NL" dirty="0"/>
+              <a:t>Internet of </a:t>
+            </a:r>
+            <a:r>
+              <a:rPr lang="nl-NL" dirty="0" err="1"/>
+              <a:t>Things</a:t>
             </a:r>
             <a:endParaRPr lang="nl-NL" dirty="0"/>
           </a:p>
-        </p:txBody>
-      </p:sp>
-      <p:sp>
-        <p:nvSpPr>
-          <p:cNvPr id="3" name="Tijdelijke aanduiding voor inhoud 2"/>
-          <p:cNvSpPr>
-            <a:spLocks noGrp="1"/>
-          </p:cNvSpPr>
-          <p:nvPr>
-            <p:ph idx="1"/>
-          </p:nvPr>
-        </p:nvSpPr>
-        <p:spPr/>
-        <p:txBody>
-          <a:bodyPr/>
-          <a:lstStyle/>
-          <a:p>
-            <a:r>
-              <a:rPr lang="en-US" dirty="0"/>
-              <a:t>Find out which people to contact</a:t>
+          <a:p>
+            <a:r>
+              <a:rPr lang="nl-NL" dirty="0" err="1"/>
+              <a:t>LoRa</a:t>
+            </a:r>
+            <a:r>
+              <a:rPr lang="nl-NL" dirty="0"/>
+              <a:t>/</a:t>
+            </a:r>
+            <a:r>
+              <a:rPr lang="nl-NL" dirty="0" err="1"/>
+              <a:t>TheThings</a:t>
             </a:r>
             <a:endParaRPr lang="nl-NL" dirty="0"/>
           </a:p>
           <a:p>
+            <a:r>
+              <a:rPr lang="nl-NL" dirty="0" err="1"/>
+              <a:t>Gathering</a:t>
+            </a:r>
+            <a:r>
+              <a:rPr lang="nl-NL" dirty="0"/>
+              <a:t> data</a:t>
+            </a:r>
+          </a:p>
+          <a:p>
             <a:pPr lvl="1"/>
             <a:r>
-              <a:rPr lang="en-US" dirty="0"/>
-              <a:t>Contacted them</a:t>
-            </a:r>
-          </a:p>
-          <a:p>
-            <a:r>
-              <a:rPr lang="en-US" dirty="0"/>
-              <a:t>Find out material costs</a:t>
-            </a:r>
+              <a:rPr lang="nl-NL" dirty="0" err="1"/>
+              <a:t>Inform</a:t>
+            </a:r>
+            <a:r>
+              <a:rPr lang="nl-NL" dirty="0"/>
+              <a:t> </a:t>
+            </a:r>
+            <a:r>
+              <a:rPr lang="nl-NL" dirty="0" err="1"/>
+              <a:t>local</a:t>
+            </a:r>
+            <a:r>
+              <a:rPr lang="nl-NL" dirty="0"/>
+              <a:t> </a:t>
+            </a:r>
+            <a:r>
+              <a:rPr lang="nl-NL" dirty="0" err="1"/>
+              <a:t>population</a:t>
+            </a:r>
+            <a:endParaRPr lang="nl-NL" dirty="0"/>
           </a:p>
           <a:p>
             <a:pPr lvl="1"/>
             <a:r>
-              <a:rPr lang="en-US" dirty="0"/>
-              <a:t>Made cost analysis</a:t>
-            </a:r>
-          </a:p>
-          <a:p>
-            <a:r>
-              <a:rPr lang="en-US" dirty="0"/>
-              <a:t>Feedback was received last week from monsieur</a:t>
-            </a:r>
-          </a:p>
-          <a:p>
-            <a:pPr lvl="1"/>
-            <a:r>
-              <a:rPr lang="en-US" dirty="0"/>
-              <a:t>Implemented this feedback </a:t>
+              <a:rPr lang="nl-NL" dirty="0"/>
+              <a:t>Plan </a:t>
+            </a:r>
+            <a:r>
+              <a:rPr lang="nl-NL" dirty="0" err="1"/>
+              <a:t>collection</a:t>
+            </a:r>
+            <a:r>
+              <a:rPr lang="nl-NL" dirty="0"/>
+              <a:t> routes</a:t>
             </a:r>
           </a:p>
         </p:txBody>
@@ -3765,7 +4034,7 @@
     </p:spTree>
     <p:extLst>
       <p:ext uri="{BB962C8B-B14F-4D97-AF65-F5344CB8AC3E}">
-        <p14:creationId xmlns:p14="http://schemas.microsoft.com/office/powerpoint/2010/main" val="837928592"/>
+        <p14:creationId xmlns:p14="http://schemas.microsoft.com/office/powerpoint/2010/main" val="4225428183"/>
       </p:ext>
     </p:extLst>
   </p:cSld>
@@ -3808,8 +4077,12 @@
           <a:lstStyle/>
           <a:p>
             <a:r>
-              <a:rPr lang="en-US" dirty="0"/>
-              <a:t>How did we do it?</a:t>
+              <a:rPr lang="nl-NL" dirty="0"/>
+              <a:t>The project: </a:t>
+            </a:r>
+            <a:r>
+              <a:rPr lang="nl-NL" dirty="0" err="1"/>
+              <a:t>Phases</a:t>
             </a:r>
             <a:endParaRPr lang="nl-NL" dirty="0"/>
           </a:p>
@@ -3827,32 +4100,170 @@
         </p:nvSpPr>
         <p:spPr/>
         <p:txBody>
-          <a:bodyPr/>
-          <a:lstStyle/>
-          <a:p>
-            <a:r>
-              <a:rPr lang="en-US" dirty="0"/>
-              <a:t>Divided up the work </a:t>
-            </a:r>
-          </a:p>
-          <a:p>
-            <a:r>
-              <a:rPr lang="en-US" dirty="0"/>
-              <a:t>Online research regarding materials &amp; costs</a:t>
-            </a:r>
-          </a:p>
-          <a:p>
-            <a:r>
-              <a:rPr lang="en-US" dirty="0"/>
-              <a:t>Brainstorming on whiteboard</a:t>
-            </a:r>
+          <a:bodyPr>
+            <a:normAutofit lnSpcReduction="10000"/>
+          </a:bodyPr>
+          <a:lstStyle/>
+          <a:p>
+            <a:r>
+              <a:rPr lang="nl-NL" dirty="0"/>
+              <a:t>Research – </a:t>
+            </a:r>
+            <a:r>
+              <a:rPr lang="nl-NL" dirty="0" err="1"/>
+              <a:t>ends</a:t>
+            </a:r>
+            <a:r>
+              <a:rPr lang="nl-NL" dirty="0"/>
+              <a:t> on 17th of April</a:t>
+            </a:r>
+          </a:p>
+          <a:p>
+            <a:pPr lvl="1"/>
+            <a:r>
+              <a:rPr lang="nl-NL" dirty="0"/>
+              <a:t>Building test </a:t>
+            </a:r>
+            <a:r>
+              <a:rPr lang="nl-NL" dirty="0" err="1"/>
+              <a:t>application</a:t>
+            </a:r>
+            <a:endParaRPr lang="nl-NL" dirty="0"/>
+          </a:p>
+          <a:p>
+            <a:pPr lvl="1"/>
+            <a:r>
+              <a:rPr lang="nl-NL" dirty="0"/>
+              <a:t>Test sensors</a:t>
+            </a:r>
+          </a:p>
+          <a:p>
+            <a:r>
+              <a:rPr lang="nl-NL" dirty="0"/>
+              <a:t>Design</a:t>
+            </a:r>
+          </a:p>
+          <a:p>
+            <a:pPr lvl="1"/>
+            <a:r>
+              <a:rPr lang="nl-NL" dirty="0"/>
+              <a:t>Design prototype </a:t>
+            </a:r>
+            <a:r>
+              <a:rPr lang="nl-NL" dirty="0" err="1"/>
+              <a:t>application</a:t>
+            </a:r>
+            <a:r>
+              <a:rPr lang="nl-NL" dirty="0"/>
+              <a:t> </a:t>
+            </a:r>
+            <a:r>
+              <a:rPr lang="nl-NL" dirty="0" err="1"/>
+              <a:t>together</a:t>
+            </a:r>
+            <a:r>
+              <a:rPr lang="nl-NL" dirty="0"/>
+              <a:t> </a:t>
+            </a:r>
+            <a:r>
+              <a:rPr lang="nl-NL" dirty="0" err="1"/>
+              <a:t>with</a:t>
+            </a:r>
+            <a:r>
+              <a:rPr lang="nl-NL" dirty="0"/>
+              <a:t> </a:t>
+            </a:r>
+            <a:r>
+              <a:rPr lang="nl-NL" dirty="0" err="1"/>
+              <a:t>the</a:t>
+            </a:r>
+            <a:r>
+              <a:rPr lang="nl-NL" dirty="0"/>
+              <a:t> stakeholders</a:t>
+            </a:r>
+          </a:p>
+          <a:p>
+            <a:r>
+              <a:rPr lang="nl-NL" dirty="0"/>
+              <a:t>Development</a:t>
+            </a:r>
+          </a:p>
+          <a:p>
+            <a:pPr lvl="1"/>
+            <a:r>
+              <a:rPr lang="nl-NL" dirty="0" err="1"/>
+              <a:t>Develop</a:t>
+            </a:r>
+            <a:r>
+              <a:rPr lang="nl-NL" dirty="0"/>
+              <a:t> prototype </a:t>
+            </a:r>
+            <a:r>
+              <a:rPr lang="nl-NL" dirty="0" err="1"/>
+              <a:t>application</a:t>
+            </a:r>
+            <a:r>
+              <a:rPr lang="nl-NL" dirty="0"/>
+              <a:t> </a:t>
+            </a:r>
+            <a:r>
+              <a:rPr lang="nl-NL" dirty="0" err="1"/>
+              <a:t>according</a:t>
+            </a:r>
+            <a:r>
+              <a:rPr lang="nl-NL" dirty="0"/>
+              <a:t> </a:t>
+            </a:r>
+            <a:r>
+              <a:rPr lang="nl-NL" dirty="0" err="1"/>
+              <a:t>to</a:t>
+            </a:r>
+            <a:r>
+              <a:rPr lang="nl-NL" dirty="0"/>
+              <a:t> </a:t>
+            </a:r>
+            <a:r>
+              <a:rPr lang="nl-NL" dirty="0" err="1"/>
+              <a:t>the</a:t>
+            </a:r>
+            <a:r>
+              <a:rPr lang="nl-NL" dirty="0"/>
+              <a:t> </a:t>
+            </a:r>
+            <a:r>
+              <a:rPr lang="nl-NL" dirty="0" err="1"/>
+              <a:t>specifications</a:t>
+            </a:r>
+            <a:r>
+              <a:rPr lang="nl-NL" dirty="0"/>
+              <a:t> we made in </a:t>
+            </a:r>
+            <a:r>
+              <a:rPr lang="nl-NL" dirty="0" err="1"/>
+              <a:t>the</a:t>
+            </a:r>
+            <a:r>
+              <a:rPr lang="nl-NL" dirty="0"/>
+              <a:t> design </a:t>
+            </a:r>
+            <a:r>
+              <a:rPr lang="nl-NL" dirty="0" err="1"/>
+              <a:t>phase</a:t>
+            </a:r>
+            <a:r>
+              <a:rPr lang="nl-NL" dirty="0"/>
+              <a:t>.</a:t>
+            </a:r>
+          </a:p>
+          <a:p>
+            <a:endParaRPr lang="nl-NL" dirty="0"/>
           </a:p>
         </p:txBody>
       </p:sp>
     </p:spTree>
     <p:extLst>
       <p:ext uri="{BB962C8B-B14F-4D97-AF65-F5344CB8AC3E}">
-        <p14:creationId xmlns:p14="http://schemas.microsoft.com/office/powerpoint/2010/main" val="1138979359"/>
+        <p14:creationId xmlns:p14="http://schemas.microsoft.com/office/powerpoint/2010/main" val="522715998"/>
       </p:ext>
     </p:extLst>
   </p:cSld>
@@ -3896,7 +4307,7 @@
           <a:p>
             <a:r>
               <a:rPr lang="en-US" dirty="0"/>
-              <a:t>What were the results?</a:t>
+              <a:t>What did we want to achieve?</a:t>
             </a:r>
             <a:endParaRPr lang="nl-NL" dirty="0"/>
           </a:p>
@@ -3918,110 +4329,53 @@
           <a:lstStyle/>
           <a:p>
             <a:r>
-              <a:rPr lang="nl-NL" dirty="0" err="1"/>
-              <a:t>Managed</a:t>
-            </a:r>
-            <a:r>
-              <a:rPr lang="nl-NL" dirty="0"/>
-              <a:t> </a:t>
-            </a:r>
-            <a:r>
-              <a:rPr lang="nl-NL" dirty="0" err="1"/>
-              <a:t>to</a:t>
-            </a:r>
-            <a:r>
-              <a:rPr lang="nl-NL" dirty="0"/>
-              <a:t> get multiple </a:t>
-            </a:r>
-            <a:r>
-              <a:rPr lang="nl-NL" dirty="0" err="1"/>
-              <a:t>contacts</a:t>
-            </a:r>
-            <a:r>
-              <a:rPr lang="nl-NL" dirty="0"/>
-              <a:t>, but </a:t>
-            </a:r>
-            <a:r>
-              <a:rPr lang="nl-NL" dirty="0" err="1"/>
-              <a:t>unable</a:t>
-            </a:r>
-            <a:r>
-              <a:rPr lang="nl-NL" dirty="0"/>
-              <a:t> </a:t>
-            </a:r>
-            <a:r>
-              <a:rPr lang="nl-NL" dirty="0" err="1"/>
-              <a:t>to</a:t>
-            </a:r>
-            <a:r>
-              <a:rPr lang="nl-NL" dirty="0"/>
-              <a:t> </a:t>
-            </a:r>
-            <a:r>
-              <a:rPr lang="nl-NL" dirty="0" err="1"/>
-              <a:t>reach</a:t>
-            </a:r>
-            <a:r>
-              <a:rPr lang="nl-NL" dirty="0"/>
-              <a:t> </a:t>
-            </a:r>
-            <a:r>
-              <a:rPr lang="nl-NL" dirty="0" err="1"/>
-              <a:t>them</a:t>
-            </a:r>
-            <a:r>
-              <a:rPr lang="nl-NL" dirty="0"/>
-              <a:t> </a:t>
-            </a:r>
-            <a:r>
-              <a:rPr lang="nl-NL" dirty="0" err="1"/>
-              <a:t>yet</a:t>
-            </a:r>
-            <a:endParaRPr lang="nl-NL" dirty="0"/>
-          </a:p>
-          <a:p>
-            <a:r>
-              <a:rPr lang="nl-NL" dirty="0"/>
-              <a:t>Brief </a:t>
-            </a:r>
-            <a:r>
-              <a:rPr lang="nl-NL" dirty="0" err="1"/>
-              <a:t>overview</a:t>
-            </a:r>
-            <a:r>
-              <a:rPr lang="nl-NL" dirty="0"/>
-              <a:t> of </a:t>
-            </a:r>
-            <a:r>
-              <a:rPr lang="nl-NL" dirty="0" err="1"/>
-              <a:t>required</a:t>
-            </a:r>
-            <a:r>
-              <a:rPr lang="nl-NL" dirty="0"/>
-              <a:t> </a:t>
-            </a:r>
-            <a:r>
-              <a:rPr lang="nl-NL" dirty="0" err="1"/>
-              <a:t>materials</a:t>
-            </a:r>
-            <a:r>
-              <a:rPr lang="nl-NL" dirty="0"/>
-              <a:t> &amp; </a:t>
-            </a:r>
-            <a:r>
-              <a:rPr lang="nl-NL" dirty="0" err="1"/>
-              <a:t>costs</a:t>
-            </a:r>
-            <a:endParaRPr lang="nl-NL" dirty="0"/>
-          </a:p>
-          <a:p>
-            <a:r>
-              <a:rPr lang="nl-NL" dirty="0" err="1"/>
-              <a:t>Updated</a:t>
-            </a:r>
-            <a:r>
-              <a:rPr lang="nl-NL" dirty="0"/>
-              <a:t> project plan</a:t>
+              <a:rPr lang="en-US" dirty="0"/>
+              <a:t>Architecture mock-up</a:t>
+            </a:r>
+          </a:p>
+          <a:p>
+            <a:pPr lvl="1"/>
+            <a:r>
+              <a:rPr lang="en-US" dirty="0"/>
+              <a:t>Finished mock-up</a:t>
+            </a:r>
+          </a:p>
+          <a:p>
+            <a:r>
+              <a:rPr lang="en-US" dirty="0"/>
+              <a:t>Start designing test application</a:t>
+            </a:r>
+          </a:p>
+          <a:p>
+            <a:pPr lvl="1"/>
+            <a:r>
+              <a:rPr lang="en-US" dirty="0"/>
+              <a:t>Almost finished test application</a:t>
+            </a:r>
+          </a:p>
+          <a:p>
+            <a:r>
+              <a:rPr lang="en-US" dirty="0"/>
+              <a:t>Research technologies</a:t>
+            </a:r>
+          </a:p>
+          <a:p>
+            <a:pPr lvl="1"/>
+            <a:r>
+              <a:rPr lang="en-US" dirty="0"/>
+              <a:t>Found required technologies</a:t>
+            </a:r>
+          </a:p>
+          <a:p>
+            <a:r>
+              <a:rPr lang="en-US" dirty="0"/>
+              <a:t>Start preparing interview</a:t>
+            </a:r>
+          </a:p>
+          <a:p>
+            <a:r>
+              <a:rPr lang="en-US" dirty="0"/>
+              <a:t>Prepared interview</a:t>
             </a:r>
           </a:p>
         </p:txBody>
@@ -4029,7 +4383,7 @@
     </p:spTree>
     <p:extLst>
       <p:ext uri="{BB962C8B-B14F-4D97-AF65-F5344CB8AC3E}">
-        <p14:creationId xmlns:p14="http://schemas.microsoft.com/office/powerpoint/2010/main" val="887890089"/>
+        <p14:creationId xmlns:p14="http://schemas.microsoft.com/office/powerpoint/2010/main" val="837928592"/>
       </p:ext>
     </p:extLst>
   </p:cSld>
@@ -4073,7 +4427,7 @@
           <a:p>
             <a:r>
               <a:rPr lang="en-US" dirty="0"/>
-              <a:t>What were the problems?</a:t>
+              <a:t>How did we do it?</a:t>
             </a:r>
             <a:endParaRPr lang="nl-NL" dirty="0"/>
           </a:p>
@@ -4096,13 +4450,41 @@
           <a:p>
             <a:r>
               <a:rPr lang="en-US" dirty="0"/>
-              <a:t>Voicemail</a:t>
+              <a:t>Brainstormed about architecture of test application</a:t>
             </a:r>
           </a:p>
           <a:p>
             <a:r>
               <a:rPr lang="en-US" dirty="0"/>
-              <a:t>Difficult to find the proper materials(I²C etc.)</a:t>
+              <a:t>Divided test application in 3 parts:</a:t>
+            </a:r>
+          </a:p>
+          <a:p>
+            <a:pPr lvl="1"/>
+            <a:r>
+              <a:rPr lang="en-US" dirty="0"/>
+              <a:t>Frontend</a:t>
+            </a:r>
+          </a:p>
+          <a:p>
+            <a:pPr lvl="1"/>
+            <a:r>
+              <a:rPr lang="en-US" dirty="0"/>
+              <a:t>Backend</a:t>
+            </a:r>
+          </a:p>
+          <a:p>
+            <a:pPr lvl="1"/>
+            <a:r>
+              <a:rPr lang="en-US" dirty="0"/>
+              <a:t>Hardware I/O</a:t>
+            </a:r>
+          </a:p>
+          <a:p>
+            <a:pPr marL="619506" indent="-457200"/>
+            <a:r>
+              <a:rPr lang="en-US" dirty="0"/>
+              <a:t>Online Research</a:t>
             </a:r>
           </a:p>
         </p:txBody>
@@ -4110,7 +4492,7 @@
     </p:spTree>
     <p:extLst>
       <p:ext uri="{BB962C8B-B14F-4D97-AF65-F5344CB8AC3E}">
-        <p14:creationId xmlns:p14="http://schemas.microsoft.com/office/powerpoint/2010/main" val="3132248203"/>
+        <p14:creationId xmlns:p14="http://schemas.microsoft.com/office/powerpoint/2010/main" val="1138979359"/>
       </p:ext>
     </p:extLst>
   </p:cSld>
@@ -4154,7 +4536,7 @@
           <a:p>
             <a:r>
               <a:rPr lang="en-US" dirty="0"/>
-              <a:t>What were the lessons learned?</a:t>
+              <a:t>What were the results?</a:t>
             </a:r>
             <a:endParaRPr lang="nl-NL" dirty="0"/>
           </a:p>
@@ -4176,37 +4558,80 @@
           <a:lstStyle/>
           <a:p>
             <a:r>
-              <a:rPr lang="en-US" dirty="0"/>
-              <a:t>Hard to reach civil servants</a:t>
-            </a:r>
-          </a:p>
-          <a:p>
-            <a:r>
-              <a:rPr lang="en-US" dirty="0"/>
-              <a:t>Materials cheaper than we thought</a:t>
-            </a:r>
-          </a:p>
-          <a:p>
-            <a:pPr marL="0" indent="0">
-              <a:buNone/>
-            </a:pPr>
-            <a:endParaRPr lang="en-US" dirty="0"/>
-          </a:p>
-          <a:p>
-            <a:pPr marL="0" indent="0">
-              <a:buNone/>
-            </a:pPr>
-            <a:endParaRPr lang="en-US" dirty="0"/>
-          </a:p>
-          <a:p>
+              <a:rPr lang="nl-NL" dirty="0" err="1"/>
+              <a:t>Almost</a:t>
+            </a:r>
+            <a:r>
+              <a:rPr lang="nl-NL" dirty="0"/>
+              <a:t> </a:t>
+            </a:r>
+            <a:r>
+              <a:rPr lang="nl-NL" dirty="0" err="1"/>
+              <a:t>finished</a:t>
+            </a:r>
+            <a:r>
+              <a:rPr lang="nl-NL" dirty="0"/>
+              <a:t> test </a:t>
+            </a:r>
+            <a:r>
+              <a:rPr lang="nl-NL" dirty="0" err="1"/>
+              <a:t>application</a:t>
+            </a:r>
+            <a:r>
+              <a:rPr lang="nl-NL" dirty="0"/>
+              <a:t> </a:t>
+            </a:r>
+            <a:r>
+              <a:rPr lang="nl-NL" dirty="0" err="1"/>
+              <a:t>with</a:t>
+            </a:r>
+            <a:r>
+              <a:rPr lang="nl-NL" dirty="0"/>
+              <a:t>:</a:t>
+            </a:r>
+          </a:p>
+          <a:p>
+            <a:pPr lvl="1"/>
+            <a:r>
+              <a:rPr lang="nl-NL" dirty="0" err="1"/>
+              <a:t>Frontend</a:t>
+            </a:r>
             <a:endParaRPr lang="nl-NL" dirty="0"/>
+          </a:p>
+          <a:p>
+            <a:pPr lvl="1"/>
+            <a:r>
+              <a:rPr lang="nl-NL" dirty="0"/>
+              <a:t>Backend</a:t>
+            </a:r>
+          </a:p>
+          <a:p>
+            <a:pPr lvl="1"/>
+            <a:r>
+              <a:rPr lang="nl-NL" dirty="0"/>
+              <a:t>Hardware I/O (</a:t>
+            </a:r>
+            <a:r>
+              <a:rPr lang="nl-NL" dirty="0" err="1"/>
+              <a:t>mocked</a:t>
+            </a:r>
+            <a:r>
+              <a:rPr lang="nl-NL" dirty="0"/>
+              <a:t>)</a:t>
+            </a:r>
+          </a:p>
+          <a:p>
+            <a:r>
+              <a:rPr lang="nl-NL" dirty="0"/>
+              <a:t>Interview</a:t>
+            </a:r>
           </a:p>
         </p:txBody>
       </p:sp>
     </p:spTree>
     <p:extLst>
       <p:ext uri="{BB962C8B-B14F-4D97-AF65-F5344CB8AC3E}">
-        <p14:creationId xmlns:p14="http://schemas.microsoft.com/office/powerpoint/2010/main" val="61758943"/>
+        <p14:creationId xmlns:p14="http://schemas.microsoft.com/office/powerpoint/2010/main" val="887890089"/>
       </p:ext>
     </p:extLst>
   </p:cSld>
@@ -4250,7 +4675,7 @@
           <a:p>
             <a:r>
               <a:rPr lang="en-US" dirty="0"/>
-              <a:t>What do we want to achieve?</a:t>
+              <a:t>What were the problems?</a:t>
             </a:r>
             <a:endParaRPr lang="nl-NL" dirty="0"/>
           </a:p>
@@ -4273,25 +4698,19 @@
           <a:p>
             <a:r>
               <a:rPr lang="en-US" dirty="0"/>
-              <a:t>Start designing test application</a:t>
+              <a:t>Last-minute cancellation of the interview</a:t>
             </a:r>
           </a:p>
           <a:p>
             <a:r>
               <a:rPr lang="en-US" dirty="0"/>
-              <a:t>Architecture mock-ups</a:t>
+              <a:t>No hardware yet &gt; Mock it.</a:t>
             </a:r>
           </a:p>
           <a:p>
             <a:r>
               <a:rPr lang="en-US" dirty="0"/>
-              <a:t>Research technologies</a:t>
-            </a:r>
-          </a:p>
-          <a:p>
-            <a:r>
-              <a:rPr lang="en-US" dirty="0"/>
-              <a:t>Start preparing interviews</a:t>
+              <a:t>Work-packages/planning still needed work after receiving feedback from Mr. Monsieur</a:t>
             </a:r>
           </a:p>
         </p:txBody>
@@ -4299,7 +4718,7 @@
     </p:spTree>
     <p:extLst>
       <p:ext uri="{BB962C8B-B14F-4D97-AF65-F5344CB8AC3E}">
-        <p14:creationId xmlns:p14="http://schemas.microsoft.com/office/powerpoint/2010/main" val="3950901886"/>
+        <p14:creationId xmlns:p14="http://schemas.microsoft.com/office/powerpoint/2010/main" val="3132248203"/>
       </p:ext>
     </p:extLst>
   </p:cSld>
@@ -4343,7 +4762,7 @@
           <a:p>
             <a:r>
               <a:rPr lang="en-US" dirty="0"/>
-              <a:t>How are we going to do it?</a:t>
+              <a:t>What were the lessons learned?</a:t>
             </a:r>
             <a:endParaRPr lang="nl-NL" dirty="0"/>
           </a:p>
@@ -4366,32 +4785,151 @@
           <a:p>
             <a:r>
               <a:rPr lang="en-US" dirty="0"/>
-              <a:t>More brainstorming on whiteboard</a:t>
-            </a:r>
-          </a:p>
-          <a:p>
-            <a:r>
-              <a:rPr lang="en-US" dirty="0"/>
-              <a:t>Online research</a:t>
-            </a:r>
-          </a:p>
-          <a:p>
-            <a:r>
-              <a:rPr lang="en-US" dirty="0"/>
-              <a:t>Use </a:t>
-            </a:r>
-            <a:r>
-              <a:rPr lang="en-US"/>
-              <a:t>available knowledge</a:t>
-            </a:r>
-            <a:endParaRPr lang="en-US" dirty="0"/>
+              <a:t>Again: Hard to reach civil servants</a:t>
+            </a:r>
+          </a:p>
+          <a:p>
+            <a:r>
+              <a:rPr lang="nl-NL" dirty="0" err="1"/>
+              <a:t>Gained</a:t>
+            </a:r>
+            <a:r>
+              <a:rPr lang="nl-NL" dirty="0"/>
+              <a:t> more </a:t>
+            </a:r>
+            <a:r>
+              <a:rPr lang="nl-NL" dirty="0" err="1"/>
+              <a:t>experience</a:t>
+            </a:r>
+            <a:r>
+              <a:rPr lang="nl-NL" dirty="0"/>
+              <a:t> </a:t>
+            </a:r>
+            <a:r>
+              <a:rPr lang="nl-NL" dirty="0" err="1"/>
+              <a:t>regarding</a:t>
+            </a:r>
+            <a:r>
+              <a:rPr lang="nl-NL" dirty="0"/>
+              <a:t> </a:t>
+            </a:r>
+            <a:r>
+              <a:rPr lang="nl-NL" dirty="0" err="1"/>
+              <a:t>working</a:t>
+            </a:r>
+            <a:r>
+              <a:rPr lang="nl-NL" dirty="0"/>
+              <a:t> </a:t>
+            </a:r>
+            <a:r>
+              <a:rPr lang="nl-NL" dirty="0" err="1"/>
+              <a:t>with</a:t>
+            </a:r>
+            <a:r>
+              <a:rPr lang="nl-NL" dirty="0"/>
+              <a:t> </a:t>
+            </a:r>
+            <a:r>
+              <a:rPr lang="nl-NL" dirty="0" err="1"/>
+              <a:t>API’s</a:t>
+            </a:r>
+            <a:endParaRPr lang="nl-NL" dirty="0"/>
           </a:p>
         </p:txBody>
       </p:sp>
     </p:spTree>
     <p:extLst>
       <p:ext uri="{BB962C8B-B14F-4D97-AF65-F5344CB8AC3E}">
-        <p14:creationId xmlns:p14="http://schemas.microsoft.com/office/powerpoint/2010/main" val="3203515607"/>
+        <p14:creationId xmlns:p14="http://schemas.microsoft.com/office/powerpoint/2010/main" val="61758943"/>
+      </p:ext>
+    </p:extLst>
+  </p:cSld>
+  <p:clrMapOvr>
+    <a:masterClrMapping/>
+  </p:clrMapOvr>
+</p:sld>
+</file>
+
+<file path=ppt/slides/slide9.xml><?xml version="1.0" encoding="utf-8"?>
+<p:sld xmlns:a="http://schemas.openxmlformats.org/drawingml/2006/main" xmlns:r="http://schemas.openxmlformats.org/officeDocument/2006/relationships" xmlns:p="http://schemas.openxmlformats.org/presentationml/2006/main">
+  <p:cSld>
+    <p:spTree>
+      <p:nvGrpSpPr>
+        <p:cNvPr id="1" name=""/>
+        <p:cNvGrpSpPr/>
+        <p:nvPr/>
+      </p:nvGrpSpPr>
+      <p:grpSpPr>
+        <a:xfrm>
+          <a:off x="0" y="0"/>
+          <a:ext cx="0" cy="0"/>
+          <a:chOff x="0" y="0"/>
+          <a:chExt cx="0" cy="0"/>
+        </a:xfrm>
+      </p:grpSpPr>
+      <p:sp>
+        <p:nvSpPr>
+          <p:cNvPr id="2" name="Titel 1"/>
+          <p:cNvSpPr>
+            <a:spLocks noGrp="1"/>
+          </p:cNvSpPr>
+          <p:nvPr>
+            <p:ph type="title"/>
+          </p:nvPr>
+        </p:nvSpPr>
+        <p:spPr/>
+        <p:txBody>
+          <a:bodyPr/>
+          <a:lstStyle/>
+          <a:p>
+            <a:r>
+              <a:rPr lang="en-US" dirty="0"/>
+              <a:t>What do we want to achieve?</a:t>
+            </a:r>
+            <a:endParaRPr lang="nl-NL" dirty="0"/>
+          </a:p>
+        </p:txBody>
+      </p:sp>
+      <p:sp>
+        <p:nvSpPr>
+          <p:cNvPr id="3" name="Tijdelijke aanduiding voor inhoud 2"/>
+          <p:cNvSpPr>
+            <a:spLocks noGrp="1"/>
+          </p:cNvSpPr>
+          <p:nvPr>
+            <p:ph idx="1"/>
+          </p:nvPr>
+        </p:nvSpPr>
+        <p:spPr/>
+        <p:txBody>
+          <a:bodyPr/>
+          <a:lstStyle/>
+          <a:p>
+            <a:r>
+              <a:rPr lang="en-US" dirty="0"/>
+              <a:t>Further building of test application</a:t>
+            </a:r>
+          </a:p>
+          <a:p>
+            <a:r>
+              <a:rPr lang="en-US" dirty="0"/>
+              <a:t>Developing </a:t>
+            </a:r>
+            <a:r>
+              <a:rPr lang="en-US" dirty="0" err="1"/>
+              <a:t>testplan</a:t>
+            </a:r>
+            <a:r>
+              <a:rPr lang="en-US" dirty="0"/>
+              <a:t> regarding sensor-testing</a:t>
+            </a:r>
+          </a:p>
+        </p:txBody>
+      </p:sp>
+    </p:spTree>
+    <p:extLst>
+      <p:ext uri="{BB962C8B-B14F-4D97-AF65-F5344CB8AC3E}">
+        <p14:creationId xmlns:p14="http://schemas.microsoft.com/office/powerpoint/2010/main" val="3950901886"/>
       </p:ext>
     </p:extLst>
   </p:cSld>

</xml_diff>